<commit_message>
Updating book pull analysis
</commit_message>
<xml_diff>
--- a/book_pull/book_pull_analysis.pptx
+++ b/book_pull/book_pull_analysis.pptx
@@ -6,6 +6,7 @@
   </p:sldMasterIdLst>
   <p:sldIdLst>
     <p:sldId id="256" r:id="rId2"/>
+    <p:sldId id="257" r:id="rId3"/>
   </p:sldIdLst>
   <p:sldSz cx="9144000" cy="6858000" type="screen4x3"/>
   <p:notesSz cx="6858000" cy="9144000"/>
@@ -3095,10 +3096,1611 @@
           <a:chExt cx="0" cy="0"/>
         </a:xfrm>
       </p:grpSpPr>
+      <p:grpSp>
+        <p:nvGrpSpPr>
+          <p:cNvPr id="17" name="Group 16"/>
+          <p:cNvGrpSpPr/>
+          <p:nvPr/>
+        </p:nvGrpSpPr>
+        <p:grpSpPr>
+          <a:xfrm>
+            <a:off x="1316519" y="1688361"/>
+            <a:ext cx="6799434" cy="4290603"/>
+            <a:chOff x="1316519" y="1688361"/>
+            <a:chExt cx="6799434" cy="4290603"/>
+          </a:xfrm>
+        </p:grpSpPr>
+        <p:sp>
+          <p:nvSpPr>
+            <p:cNvPr id="4" name="Rectangle 3"/>
+            <p:cNvSpPr/>
+            <p:nvPr/>
+          </p:nvSpPr>
+          <p:spPr>
+            <a:xfrm>
+              <a:off x="4925331" y="1688361"/>
+              <a:ext cx="2214849" cy="3593577"/>
+            </a:xfrm>
+            <a:prstGeom prst="rect">
+              <a:avLst/>
+            </a:prstGeom>
+            <a:noFill/>
+            <a:ln>
+              <a:solidFill>
+                <a:schemeClr val="tx1"/>
+              </a:solidFill>
+            </a:ln>
+          </p:spPr>
+          <p:style>
+            <a:lnRef idx="1">
+              <a:schemeClr val="accent1"/>
+            </a:lnRef>
+            <a:fillRef idx="3">
+              <a:schemeClr val="accent1"/>
+            </a:fillRef>
+            <a:effectRef idx="2">
+              <a:schemeClr val="accent1"/>
+            </a:effectRef>
+            <a:fontRef idx="minor">
+              <a:schemeClr val="lt1"/>
+            </a:fontRef>
+          </p:style>
+          <p:txBody>
+            <a:bodyPr rtlCol="0" anchor="ctr"/>
+            <a:lstStyle/>
+            <a:p>
+              <a:pPr algn="ctr"/>
+              <a:endParaRPr lang="en-US"/>
+            </a:p>
+          </p:txBody>
+        </p:sp>
+        <p:sp>
+          <p:nvSpPr>
+            <p:cNvPr id="8" name="Rectangle 7"/>
+            <p:cNvSpPr/>
+            <p:nvPr/>
+          </p:nvSpPr>
+          <p:spPr>
+            <a:xfrm>
+              <a:off x="1316519" y="5281938"/>
+              <a:ext cx="6799434" cy="61973"/>
+            </a:xfrm>
+            <a:prstGeom prst="rect">
+              <a:avLst/>
+            </a:prstGeom>
+            <a:pattFill prst="ltUpDiag">
+              <a:fgClr>
+                <a:schemeClr val="tx1"/>
+              </a:fgClr>
+              <a:bgClr>
+                <a:schemeClr val="bg1"/>
+              </a:bgClr>
+            </a:pattFill>
+            <a:ln>
+              <a:solidFill>
+                <a:schemeClr val="tx1"/>
+              </a:solidFill>
+            </a:ln>
+          </p:spPr>
+          <p:style>
+            <a:lnRef idx="1">
+              <a:schemeClr val="accent1"/>
+            </a:lnRef>
+            <a:fillRef idx="3">
+              <a:schemeClr val="accent1"/>
+            </a:fillRef>
+            <a:effectRef idx="2">
+              <a:schemeClr val="accent1"/>
+            </a:effectRef>
+            <a:fontRef idx="minor">
+              <a:schemeClr val="lt1"/>
+            </a:fontRef>
+          </p:style>
+          <p:txBody>
+            <a:bodyPr rtlCol="0" anchor="ctr"/>
+            <a:lstStyle/>
+            <a:p>
+              <a:pPr algn="ctr"/>
+              <a:endParaRPr lang="en-US"/>
+            </a:p>
+          </p:txBody>
+        </p:sp>
+        <p:sp>
+          <p:nvSpPr>
+            <p:cNvPr id="9" name="Rectangle 8"/>
+            <p:cNvSpPr/>
+            <p:nvPr/>
+          </p:nvSpPr>
+          <p:spPr>
+            <a:xfrm rot="19258640">
+              <a:off x="3431206" y="2434125"/>
+              <a:ext cx="1833259" cy="2555777"/>
+            </a:xfrm>
+            <a:prstGeom prst="rect">
+              <a:avLst/>
+            </a:prstGeom>
+            <a:solidFill>
+              <a:schemeClr val="bg1">
+                <a:lumMod val="85000"/>
+              </a:schemeClr>
+            </a:solidFill>
+            <a:ln>
+              <a:solidFill>
+                <a:schemeClr val="tx1"/>
+              </a:solidFill>
+            </a:ln>
+          </p:spPr>
+          <p:style>
+            <a:lnRef idx="1">
+              <a:schemeClr val="accent1"/>
+            </a:lnRef>
+            <a:fillRef idx="3">
+              <a:schemeClr val="accent1"/>
+            </a:fillRef>
+            <a:effectRef idx="2">
+              <a:schemeClr val="accent1"/>
+            </a:effectRef>
+            <a:fontRef idx="minor">
+              <a:schemeClr val="lt1"/>
+            </a:fontRef>
+          </p:style>
+          <p:txBody>
+            <a:bodyPr rtlCol="0" anchor="ctr"/>
+            <a:lstStyle/>
+            <a:p>
+              <a:pPr algn="ctr"/>
+              <a:endParaRPr lang="en-US"/>
+            </a:p>
+          </p:txBody>
+        </p:sp>
+        <p:sp>
+          <p:nvSpPr>
+            <p:cNvPr id="10" name="TextBox 9"/>
+            <p:cNvSpPr txBox="1"/>
+            <p:nvPr/>
+          </p:nvSpPr>
+          <p:spPr>
+            <a:xfrm>
+              <a:off x="5420960" y="4724314"/>
+              <a:ext cx="307408" cy="369332"/>
+            </a:xfrm>
+            <a:prstGeom prst="rect">
+              <a:avLst/>
+            </a:prstGeom>
+            <a:noFill/>
+          </p:spPr>
+          <p:txBody>
+            <a:bodyPr wrap="none" rtlCol="0">
+              <a:spAutoFit/>
+            </a:bodyPr>
+            <a:lstStyle/>
+            <a:p>
+              <a:r>
+                <a:rPr lang="en-US" dirty="0" err="1" smtClean="0"/>
+                <a:t>θ</a:t>
+              </a:r>
+              <a:endParaRPr lang="en-US" dirty="0"/>
+            </a:p>
+          </p:txBody>
+        </p:sp>
+        <p:sp>
+          <p:nvSpPr>
+            <p:cNvPr id="14" name="Freeform 13"/>
+            <p:cNvSpPr/>
+            <p:nvPr/>
+          </p:nvSpPr>
+          <p:spPr>
+            <a:xfrm>
+              <a:off x="5250587" y="4724314"/>
+              <a:ext cx="170373" cy="433707"/>
+            </a:xfrm>
+            <a:custGeom>
+              <a:avLst/>
+              <a:gdLst>
+                <a:gd name="connsiteX0" fmla="*/ 615798 w 615798"/>
+                <a:gd name="connsiteY0" fmla="*/ 764841 h 764841"/>
+                <a:gd name="connsiteX1" fmla="*/ 445425 w 615798"/>
+                <a:gd name="connsiteY1" fmla="*/ 346624 h 764841"/>
+                <a:gd name="connsiteX2" fmla="*/ 42725 w 615798"/>
+                <a:gd name="connsiteY2" fmla="*/ 36832 h 764841"/>
+                <a:gd name="connsiteX3" fmla="*/ 11748 w 615798"/>
+                <a:gd name="connsiteY3" fmla="*/ 5853 h 764841"/>
+              </a:gdLst>
+              <a:ahLst/>
+              <a:cxnLst>
+                <a:cxn ang="0">
+                  <a:pos x="connsiteX0" y="connsiteY0"/>
+                </a:cxn>
+                <a:cxn ang="0">
+                  <a:pos x="connsiteX1" y="connsiteY1"/>
+                </a:cxn>
+                <a:cxn ang="0">
+                  <a:pos x="connsiteX2" y="connsiteY2"/>
+                </a:cxn>
+                <a:cxn ang="0">
+                  <a:pos x="connsiteX3" y="connsiteY3"/>
+                </a:cxn>
+              </a:cxnLst>
+              <a:rect l="l" t="t" r="r" b="b"/>
+              <a:pathLst>
+                <a:path w="615798" h="764841">
+                  <a:moveTo>
+                    <a:pt x="615798" y="764841"/>
+                  </a:moveTo>
+                  <a:cubicBezTo>
+                    <a:pt x="578367" y="616400"/>
+                    <a:pt x="540937" y="467959"/>
+                    <a:pt x="445425" y="346624"/>
+                  </a:cubicBezTo>
+                  <a:cubicBezTo>
+                    <a:pt x="349913" y="225289"/>
+                    <a:pt x="115005" y="93627"/>
+                    <a:pt x="42725" y="36832"/>
+                  </a:cubicBezTo>
+                  <a:cubicBezTo>
+                    <a:pt x="-29555" y="-19963"/>
+                    <a:pt x="11748" y="5853"/>
+                    <a:pt x="11748" y="5853"/>
+                  </a:cubicBezTo>
+                </a:path>
+              </a:pathLst>
+            </a:custGeom>
+            <a:ln>
+              <a:solidFill>
+                <a:schemeClr val="tx1"/>
+              </a:solidFill>
+            </a:ln>
+          </p:spPr>
+          <p:style>
+            <a:lnRef idx="2">
+              <a:schemeClr val="accent1"/>
+            </a:lnRef>
+            <a:fillRef idx="0">
+              <a:schemeClr val="accent1"/>
+            </a:fillRef>
+            <a:effectRef idx="1">
+              <a:schemeClr val="accent1"/>
+            </a:effectRef>
+            <a:fontRef idx="minor">
+              <a:schemeClr val="tx1"/>
+            </a:fontRef>
+          </p:style>
+          <p:txBody>
+            <a:bodyPr rtlCol="0" anchor="ctr"/>
+            <a:lstStyle/>
+            <a:p>
+              <a:pPr algn="ctr"/>
+              <a:endParaRPr lang="en-US"/>
+            </a:p>
+          </p:txBody>
+        </p:sp>
+        <p:sp>
+          <p:nvSpPr>
+            <p:cNvPr id="15" name="Left Brace 14"/>
+            <p:cNvSpPr/>
+            <p:nvPr/>
+          </p:nvSpPr>
+          <p:spPr>
+            <a:xfrm rot="16200000">
+              <a:off x="4600045" y="5266445"/>
+              <a:ext cx="216839" cy="433732"/>
+            </a:xfrm>
+            <a:prstGeom prst="leftBrace">
+              <a:avLst/>
+            </a:prstGeom>
+            <a:ln>
+              <a:solidFill>
+                <a:schemeClr val="tx1"/>
+              </a:solidFill>
+            </a:ln>
+          </p:spPr>
+          <p:style>
+            <a:lnRef idx="2">
+              <a:schemeClr val="accent1"/>
+            </a:lnRef>
+            <a:fillRef idx="0">
+              <a:schemeClr val="accent1"/>
+            </a:fillRef>
+            <a:effectRef idx="1">
+              <a:schemeClr val="accent1"/>
+            </a:effectRef>
+            <a:fontRef idx="minor">
+              <a:schemeClr val="tx1"/>
+            </a:fontRef>
+          </p:style>
+          <p:txBody>
+            <a:bodyPr rtlCol="0" anchor="ctr"/>
+            <a:lstStyle/>
+            <a:p>
+              <a:pPr algn="ctr"/>
+              <a:endParaRPr lang="en-US"/>
+            </a:p>
+          </p:txBody>
+        </p:sp>
+        <p:sp>
+          <p:nvSpPr>
+            <p:cNvPr id="16" name="TextBox 15"/>
+            <p:cNvSpPr txBox="1"/>
+            <p:nvPr/>
+          </p:nvSpPr>
+          <p:spPr>
+            <a:xfrm>
+              <a:off x="4588412" y="5609632"/>
+              <a:ext cx="305943" cy="369332"/>
+            </a:xfrm>
+            <a:prstGeom prst="rect">
+              <a:avLst/>
+            </a:prstGeom>
+            <a:noFill/>
+          </p:spPr>
+          <p:txBody>
+            <a:bodyPr wrap="none" rtlCol="0">
+              <a:spAutoFit/>
+            </a:bodyPr>
+            <a:lstStyle/>
+            <a:p>
+              <a:r>
+                <a:rPr lang="en-US" dirty="0" smtClean="0"/>
+                <a:t>d</a:t>
+              </a:r>
+              <a:endParaRPr lang="en-US" dirty="0"/>
+            </a:p>
+          </p:txBody>
+        </p:sp>
+      </p:grpSp>
+      <p:cxnSp>
+        <p:nvCxnSpPr>
+          <p:cNvPr id="19" name="Straight Arrow Connector 18"/>
+          <p:cNvCxnSpPr/>
+          <p:nvPr/>
+        </p:nvCxnSpPr>
+        <p:spPr>
+          <a:xfrm>
+            <a:off x="3066715" y="1796788"/>
+            <a:ext cx="975773" cy="1037800"/>
+          </a:xfrm>
+          <a:prstGeom prst="straightConnector1">
+            <a:avLst/>
+          </a:prstGeom>
+          <a:ln>
+            <a:solidFill>
+              <a:schemeClr val="tx1"/>
+            </a:solidFill>
+            <a:tailEnd type="arrow"/>
+          </a:ln>
+        </p:spPr>
+        <p:style>
+          <a:lnRef idx="2">
+            <a:schemeClr val="accent1"/>
+          </a:lnRef>
+          <a:fillRef idx="0">
+            <a:schemeClr val="accent1"/>
+          </a:fillRef>
+          <a:effectRef idx="1">
+            <a:schemeClr val="accent1"/>
+          </a:effectRef>
+          <a:fontRef idx="minor">
+            <a:schemeClr val="tx1"/>
+          </a:fontRef>
+        </p:style>
+      </p:cxnSp>
+      <p:cxnSp>
+        <p:nvCxnSpPr>
+          <p:cNvPr id="20" name="Straight Arrow Connector 19"/>
+          <p:cNvCxnSpPr/>
+          <p:nvPr/>
+        </p:nvCxnSpPr>
+        <p:spPr>
+          <a:xfrm flipH="1" flipV="1">
+            <a:off x="6840330" y="2468088"/>
+            <a:ext cx="702550" cy="908635"/>
+          </a:xfrm>
+          <a:prstGeom prst="straightConnector1">
+            <a:avLst/>
+          </a:prstGeom>
+          <a:ln>
+            <a:solidFill>
+              <a:schemeClr val="tx1"/>
+            </a:solidFill>
+            <a:tailEnd type="arrow"/>
+          </a:ln>
+        </p:spPr>
+        <p:style>
+          <a:lnRef idx="2">
+            <a:schemeClr val="accent1"/>
+          </a:lnRef>
+          <a:fillRef idx="0">
+            <a:schemeClr val="accent1"/>
+          </a:fillRef>
+          <a:effectRef idx="1">
+            <a:schemeClr val="accent1"/>
+          </a:effectRef>
+          <a:fontRef idx="minor">
+            <a:schemeClr val="tx1"/>
+          </a:fontRef>
+        </p:style>
+      </p:cxnSp>
+      <p:sp>
+        <p:nvSpPr>
+          <p:cNvPr id="22" name="TextBox 21"/>
+          <p:cNvSpPr txBox="1"/>
+          <p:nvPr/>
+        </p:nvSpPr>
+        <p:spPr>
+          <a:xfrm>
+            <a:off x="7310554" y="3407702"/>
+            <a:ext cx="1337814" cy="646331"/>
+          </a:xfrm>
+          <a:prstGeom prst="rect">
+            <a:avLst/>
+          </a:prstGeom>
+          <a:noFill/>
+        </p:spPr>
+        <p:txBody>
+          <a:bodyPr wrap="none" rtlCol="0">
+            <a:spAutoFit/>
+          </a:bodyPr>
+          <a:lstStyle/>
+          <a:p>
+            <a:r>
+              <a:rPr lang="en-US" dirty="0" smtClean="0"/>
+              <a:t>Neighboring</a:t>
+            </a:r>
+          </a:p>
+          <a:p>
+            <a:r>
+              <a:rPr lang="en-US" dirty="0" smtClean="0"/>
+              <a:t>object</a:t>
+            </a:r>
+            <a:endParaRPr lang="en-US" dirty="0"/>
+          </a:p>
+        </p:txBody>
+      </p:sp>
+      <p:sp>
+        <p:nvSpPr>
+          <p:cNvPr id="23" name="TextBox 22"/>
+          <p:cNvSpPr txBox="1"/>
+          <p:nvPr/>
+        </p:nvSpPr>
+        <p:spPr>
+          <a:xfrm>
+            <a:off x="2397808" y="1365195"/>
+            <a:ext cx="1582484" cy="369332"/>
+          </a:xfrm>
+          <a:prstGeom prst="rect">
+            <a:avLst/>
+          </a:prstGeom>
+          <a:noFill/>
+        </p:spPr>
+        <p:txBody>
+          <a:bodyPr wrap="none" rtlCol="0">
+            <a:spAutoFit/>
+          </a:bodyPr>
+          <a:lstStyle/>
+          <a:p>
+            <a:r>
+              <a:rPr lang="en-US" dirty="0" smtClean="0"/>
+              <a:t>Pivoting object</a:t>
+            </a:r>
+            <a:endParaRPr lang="en-US" dirty="0"/>
+          </a:p>
+        </p:txBody>
+      </p:sp>
     </p:spTree>
     <p:extLst>
       <p:ext uri="{BB962C8B-B14F-4D97-AF65-F5344CB8AC3E}">
         <p14:creationId xmlns:p14="http://schemas.microsoft.com/office/powerpoint/2010/main" val="1248672456"/>
+      </p:ext>
+    </p:extLst>
+  </p:cSld>
+  <p:clrMapOvr>
+    <a:masterClrMapping/>
+  </p:clrMapOvr>
+</p:sld>
+</file>
+
+<file path=ppt/slides/slide2.xml><?xml version="1.0" encoding="utf-8"?>
+<p:sld xmlns:a="http://schemas.openxmlformats.org/drawingml/2006/main" xmlns:r="http://schemas.openxmlformats.org/officeDocument/2006/relationships" xmlns:p="http://schemas.openxmlformats.org/presentationml/2006/main">
+  <p:cSld>
+    <p:spTree>
+      <p:nvGrpSpPr>
+        <p:cNvPr id="1" name=""/>
+        <p:cNvGrpSpPr/>
+        <p:nvPr/>
+      </p:nvGrpSpPr>
+      <p:grpSpPr>
+        <a:xfrm>
+          <a:off x="0" y="0"/>
+          <a:ext cx="0" cy="0"/>
+          <a:chOff x="0" y="0"/>
+          <a:chExt cx="0" cy="0"/>
+        </a:xfrm>
+      </p:grpSpPr>
+      <p:grpSp>
+        <p:nvGrpSpPr>
+          <p:cNvPr id="45" name="Group 44"/>
+          <p:cNvGrpSpPr/>
+          <p:nvPr/>
+        </p:nvGrpSpPr>
+        <p:grpSpPr>
+          <a:xfrm>
+            <a:off x="1316519" y="1688361"/>
+            <a:ext cx="6799434" cy="4958008"/>
+            <a:chOff x="1316519" y="1688361"/>
+            <a:chExt cx="6799434" cy="4958008"/>
+          </a:xfrm>
+        </p:grpSpPr>
+        <p:sp>
+          <p:nvSpPr>
+            <p:cNvPr id="44" name="Rectangle 43"/>
+            <p:cNvSpPr/>
+            <p:nvPr/>
+          </p:nvSpPr>
+          <p:spPr>
+            <a:xfrm rot="18900000">
+              <a:off x="5180153" y="3959881"/>
+              <a:ext cx="217419" cy="248349"/>
+            </a:xfrm>
+            <a:prstGeom prst="rect">
+              <a:avLst/>
+            </a:prstGeom>
+            <a:solidFill>
+              <a:schemeClr val="bg1">
+                <a:lumMod val="50000"/>
+              </a:schemeClr>
+            </a:solidFill>
+            <a:ln>
+              <a:solidFill>
+                <a:schemeClr val="bg1">
+                  <a:lumMod val="50000"/>
+                </a:schemeClr>
+              </a:solidFill>
+            </a:ln>
+          </p:spPr>
+          <p:style>
+            <a:lnRef idx="1">
+              <a:schemeClr val="accent1"/>
+            </a:lnRef>
+            <a:fillRef idx="3">
+              <a:schemeClr val="accent1"/>
+            </a:fillRef>
+            <a:effectRef idx="2">
+              <a:schemeClr val="accent1"/>
+            </a:effectRef>
+            <a:fontRef idx="minor">
+              <a:schemeClr val="lt1"/>
+            </a:fontRef>
+          </p:style>
+          <p:txBody>
+            <a:bodyPr rtlCol="0" anchor="ctr"/>
+            <a:lstStyle/>
+            <a:p>
+              <a:pPr algn="ctr"/>
+              <a:endParaRPr lang="en-US"/>
+            </a:p>
+          </p:txBody>
+        </p:sp>
+        <p:grpSp>
+          <p:nvGrpSpPr>
+            <p:cNvPr id="17" name="Group 16"/>
+            <p:cNvGrpSpPr/>
+            <p:nvPr/>
+          </p:nvGrpSpPr>
+          <p:grpSpPr>
+            <a:xfrm>
+              <a:off x="1316519" y="1688361"/>
+              <a:ext cx="6799434" cy="4290603"/>
+              <a:chOff x="1316519" y="1688361"/>
+              <a:chExt cx="6799434" cy="4290603"/>
+            </a:xfrm>
+          </p:grpSpPr>
+          <p:sp>
+            <p:nvSpPr>
+              <p:cNvPr id="4" name="Rectangle 3"/>
+              <p:cNvSpPr/>
+              <p:nvPr/>
+            </p:nvSpPr>
+            <p:spPr>
+              <a:xfrm>
+                <a:off x="4925331" y="1688361"/>
+                <a:ext cx="2214849" cy="3593577"/>
+              </a:xfrm>
+              <a:prstGeom prst="rect">
+                <a:avLst/>
+              </a:prstGeom>
+              <a:noFill/>
+              <a:ln>
+                <a:solidFill>
+                  <a:schemeClr val="tx1"/>
+                </a:solidFill>
+              </a:ln>
+            </p:spPr>
+            <p:style>
+              <a:lnRef idx="1">
+                <a:schemeClr val="accent1"/>
+              </a:lnRef>
+              <a:fillRef idx="3">
+                <a:schemeClr val="accent1"/>
+              </a:fillRef>
+              <a:effectRef idx="2">
+                <a:schemeClr val="accent1"/>
+              </a:effectRef>
+              <a:fontRef idx="minor">
+                <a:schemeClr val="lt1"/>
+              </a:fontRef>
+            </p:style>
+            <p:txBody>
+              <a:bodyPr rtlCol="0" anchor="ctr"/>
+              <a:lstStyle/>
+              <a:p>
+                <a:pPr algn="ctr"/>
+                <a:endParaRPr lang="en-US"/>
+              </a:p>
+            </p:txBody>
+          </p:sp>
+          <p:sp>
+            <p:nvSpPr>
+              <p:cNvPr id="8" name="Rectangle 7"/>
+              <p:cNvSpPr/>
+              <p:nvPr/>
+            </p:nvSpPr>
+            <p:spPr>
+              <a:xfrm>
+                <a:off x="1316519" y="5281938"/>
+                <a:ext cx="6799434" cy="61973"/>
+              </a:xfrm>
+              <a:prstGeom prst="rect">
+                <a:avLst/>
+              </a:prstGeom>
+              <a:pattFill prst="ltUpDiag">
+                <a:fgClr>
+                  <a:schemeClr val="tx1"/>
+                </a:fgClr>
+                <a:bgClr>
+                  <a:schemeClr val="bg1"/>
+                </a:bgClr>
+              </a:pattFill>
+              <a:ln>
+                <a:solidFill>
+                  <a:schemeClr val="tx1"/>
+                </a:solidFill>
+              </a:ln>
+            </p:spPr>
+            <p:style>
+              <a:lnRef idx="1">
+                <a:schemeClr val="accent1"/>
+              </a:lnRef>
+              <a:fillRef idx="3">
+                <a:schemeClr val="accent1"/>
+              </a:fillRef>
+              <a:effectRef idx="2">
+                <a:schemeClr val="accent1"/>
+              </a:effectRef>
+              <a:fontRef idx="minor">
+                <a:schemeClr val="lt1"/>
+              </a:fontRef>
+            </p:style>
+            <p:txBody>
+              <a:bodyPr rtlCol="0" anchor="ctr"/>
+              <a:lstStyle/>
+              <a:p>
+                <a:pPr algn="ctr"/>
+                <a:endParaRPr lang="en-US"/>
+              </a:p>
+            </p:txBody>
+          </p:sp>
+          <p:sp>
+            <p:nvSpPr>
+              <p:cNvPr id="9" name="Rectangle 8"/>
+              <p:cNvSpPr/>
+              <p:nvPr/>
+            </p:nvSpPr>
+            <p:spPr>
+              <a:xfrm rot="19258640">
+                <a:off x="3431206" y="2434125"/>
+                <a:ext cx="1833259" cy="2555777"/>
+              </a:xfrm>
+              <a:prstGeom prst="rect">
+                <a:avLst/>
+              </a:prstGeom>
+              <a:noFill/>
+              <a:ln>
+                <a:solidFill>
+                  <a:schemeClr val="tx1"/>
+                </a:solidFill>
+              </a:ln>
+            </p:spPr>
+            <p:style>
+              <a:lnRef idx="1">
+                <a:schemeClr val="accent1"/>
+              </a:lnRef>
+              <a:fillRef idx="3">
+                <a:schemeClr val="accent1"/>
+              </a:fillRef>
+              <a:effectRef idx="2">
+                <a:schemeClr val="accent1"/>
+              </a:effectRef>
+              <a:fontRef idx="minor">
+                <a:schemeClr val="lt1"/>
+              </a:fontRef>
+            </p:style>
+            <p:txBody>
+              <a:bodyPr rtlCol="0" anchor="ctr"/>
+              <a:lstStyle/>
+              <a:p>
+                <a:pPr algn="ctr"/>
+                <a:endParaRPr lang="en-US"/>
+              </a:p>
+            </p:txBody>
+          </p:sp>
+          <p:sp>
+            <p:nvSpPr>
+              <p:cNvPr id="10" name="TextBox 9"/>
+              <p:cNvSpPr txBox="1"/>
+              <p:nvPr/>
+            </p:nvSpPr>
+            <p:spPr>
+              <a:xfrm>
+                <a:off x="5420960" y="4724314"/>
+                <a:ext cx="307408" cy="369332"/>
+              </a:xfrm>
+              <a:prstGeom prst="rect">
+                <a:avLst/>
+              </a:prstGeom>
+              <a:noFill/>
+            </p:spPr>
+            <p:txBody>
+              <a:bodyPr wrap="none" rtlCol="0">
+                <a:spAutoFit/>
+              </a:bodyPr>
+              <a:lstStyle/>
+              <a:p>
+                <a:r>
+                  <a:rPr lang="en-US" dirty="0" err="1" smtClean="0"/>
+                  <a:t>θ</a:t>
+                </a:r>
+                <a:endParaRPr lang="en-US" dirty="0"/>
+              </a:p>
+            </p:txBody>
+          </p:sp>
+          <p:sp>
+            <p:nvSpPr>
+              <p:cNvPr id="14" name="Freeform 13"/>
+              <p:cNvSpPr/>
+              <p:nvPr/>
+            </p:nvSpPr>
+            <p:spPr>
+              <a:xfrm>
+                <a:off x="5250587" y="4724314"/>
+                <a:ext cx="170373" cy="433707"/>
+              </a:xfrm>
+              <a:custGeom>
+                <a:avLst/>
+                <a:gdLst>
+                  <a:gd name="connsiteX0" fmla="*/ 615798 w 615798"/>
+                  <a:gd name="connsiteY0" fmla="*/ 764841 h 764841"/>
+                  <a:gd name="connsiteX1" fmla="*/ 445425 w 615798"/>
+                  <a:gd name="connsiteY1" fmla="*/ 346624 h 764841"/>
+                  <a:gd name="connsiteX2" fmla="*/ 42725 w 615798"/>
+                  <a:gd name="connsiteY2" fmla="*/ 36832 h 764841"/>
+                  <a:gd name="connsiteX3" fmla="*/ 11748 w 615798"/>
+                  <a:gd name="connsiteY3" fmla="*/ 5853 h 764841"/>
+                </a:gdLst>
+                <a:ahLst/>
+                <a:cxnLst>
+                  <a:cxn ang="0">
+                    <a:pos x="connsiteX0" y="connsiteY0"/>
+                  </a:cxn>
+                  <a:cxn ang="0">
+                    <a:pos x="connsiteX1" y="connsiteY1"/>
+                  </a:cxn>
+                  <a:cxn ang="0">
+                    <a:pos x="connsiteX2" y="connsiteY2"/>
+                  </a:cxn>
+                  <a:cxn ang="0">
+                    <a:pos x="connsiteX3" y="connsiteY3"/>
+                  </a:cxn>
+                </a:cxnLst>
+                <a:rect l="l" t="t" r="r" b="b"/>
+                <a:pathLst>
+                  <a:path w="615798" h="764841">
+                    <a:moveTo>
+                      <a:pt x="615798" y="764841"/>
+                    </a:moveTo>
+                    <a:cubicBezTo>
+                      <a:pt x="578367" y="616400"/>
+                      <a:pt x="540937" y="467959"/>
+                      <a:pt x="445425" y="346624"/>
+                    </a:cubicBezTo>
+                    <a:cubicBezTo>
+                      <a:pt x="349913" y="225289"/>
+                      <a:pt x="115005" y="93627"/>
+                      <a:pt x="42725" y="36832"/>
+                    </a:cubicBezTo>
+                    <a:cubicBezTo>
+                      <a:pt x="-29555" y="-19963"/>
+                      <a:pt x="11748" y="5853"/>
+                      <a:pt x="11748" y="5853"/>
+                    </a:cubicBezTo>
+                  </a:path>
+                </a:pathLst>
+              </a:custGeom>
+              <a:ln>
+                <a:solidFill>
+                  <a:schemeClr val="tx1"/>
+                </a:solidFill>
+              </a:ln>
+            </p:spPr>
+            <p:style>
+              <a:lnRef idx="2">
+                <a:schemeClr val="accent1"/>
+              </a:lnRef>
+              <a:fillRef idx="0">
+                <a:schemeClr val="accent1"/>
+              </a:fillRef>
+              <a:effectRef idx="1">
+                <a:schemeClr val="accent1"/>
+              </a:effectRef>
+              <a:fontRef idx="minor">
+                <a:schemeClr val="tx1"/>
+              </a:fontRef>
+            </p:style>
+            <p:txBody>
+              <a:bodyPr rtlCol="0" anchor="ctr"/>
+              <a:lstStyle/>
+              <a:p>
+                <a:pPr algn="ctr"/>
+                <a:endParaRPr lang="en-US"/>
+              </a:p>
+            </p:txBody>
+          </p:sp>
+          <p:sp>
+            <p:nvSpPr>
+              <p:cNvPr id="15" name="Left Brace 14"/>
+              <p:cNvSpPr/>
+              <p:nvPr/>
+            </p:nvSpPr>
+            <p:spPr>
+              <a:xfrm rot="16200000">
+                <a:off x="4600045" y="5266445"/>
+                <a:ext cx="216839" cy="433732"/>
+              </a:xfrm>
+              <a:prstGeom prst="leftBrace">
+                <a:avLst/>
+              </a:prstGeom>
+              <a:ln>
+                <a:solidFill>
+                  <a:schemeClr val="tx1"/>
+                </a:solidFill>
+              </a:ln>
+            </p:spPr>
+            <p:style>
+              <a:lnRef idx="2">
+                <a:schemeClr val="accent1"/>
+              </a:lnRef>
+              <a:fillRef idx="0">
+                <a:schemeClr val="accent1"/>
+              </a:fillRef>
+              <a:effectRef idx="1">
+                <a:schemeClr val="accent1"/>
+              </a:effectRef>
+              <a:fontRef idx="minor">
+                <a:schemeClr val="tx1"/>
+              </a:fontRef>
+            </p:style>
+            <p:txBody>
+              <a:bodyPr rtlCol="0" anchor="ctr"/>
+              <a:lstStyle/>
+              <a:p>
+                <a:pPr algn="ctr"/>
+                <a:endParaRPr lang="en-US"/>
+              </a:p>
+            </p:txBody>
+          </p:sp>
+          <p:sp>
+            <p:nvSpPr>
+              <p:cNvPr id="16" name="TextBox 15"/>
+              <p:cNvSpPr txBox="1"/>
+              <p:nvPr/>
+            </p:nvSpPr>
+            <p:spPr>
+              <a:xfrm>
+                <a:off x="4588412" y="5609632"/>
+                <a:ext cx="305943" cy="369332"/>
+              </a:xfrm>
+              <a:prstGeom prst="rect">
+                <a:avLst/>
+              </a:prstGeom>
+              <a:noFill/>
+            </p:spPr>
+            <p:txBody>
+              <a:bodyPr wrap="none" rtlCol="0">
+                <a:spAutoFit/>
+              </a:bodyPr>
+              <a:lstStyle/>
+              <a:p>
+                <a:r>
+                  <a:rPr lang="en-US" dirty="0" smtClean="0"/>
+                  <a:t>d</a:t>
+                </a:r>
+                <a:endParaRPr lang="en-US" dirty="0"/>
+              </a:p>
+            </p:txBody>
+          </p:sp>
+        </p:grpSp>
+        <p:sp>
+          <p:nvSpPr>
+            <p:cNvPr id="2" name="Oval 1"/>
+            <p:cNvSpPr/>
+            <p:nvPr/>
+          </p:nvSpPr>
+          <p:spPr>
+            <a:xfrm>
+              <a:off x="3918580" y="3415447"/>
+              <a:ext cx="137160" cy="137160"/>
+            </a:xfrm>
+            <a:prstGeom prst="ellipse">
+              <a:avLst/>
+            </a:prstGeom>
+            <a:solidFill>
+              <a:schemeClr val="tx1"/>
+            </a:solidFill>
+            <a:ln>
+              <a:solidFill>
+                <a:schemeClr val="tx1"/>
+              </a:solidFill>
+            </a:ln>
+          </p:spPr>
+          <p:style>
+            <a:lnRef idx="1">
+              <a:schemeClr val="accent1"/>
+            </a:lnRef>
+            <a:fillRef idx="3">
+              <a:schemeClr val="accent1"/>
+            </a:fillRef>
+            <a:effectRef idx="2">
+              <a:schemeClr val="accent1"/>
+            </a:effectRef>
+            <a:fontRef idx="minor">
+              <a:schemeClr val="lt1"/>
+            </a:fontRef>
+          </p:style>
+          <p:txBody>
+            <a:bodyPr rtlCol="0" anchor="ctr"/>
+            <a:lstStyle/>
+            <a:p>
+              <a:pPr algn="ctr"/>
+              <a:endParaRPr lang="en-US"/>
+            </a:p>
+          </p:txBody>
+        </p:sp>
+        <p:cxnSp>
+          <p:nvCxnSpPr>
+            <p:cNvPr id="5" name="Straight Arrow Connector 4"/>
+            <p:cNvCxnSpPr/>
+            <p:nvPr/>
+          </p:nvCxnSpPr>
+          <p:spPr>
+            <a:xfrm>
+              <a:off x="4000619" y="3532520"/>
+              <a:ext cx="0" cy="912982"/>
+            </a:xfrm>
+            <a:prstGeom prst="straightConnector1">
+              <a:avLst/>
+            </a:prstGeom>
+            <a:ln>
+              <a:solidFill>
+                <a:schemeClr val="tx1"/>
+              </a:solidFill>
+              <a:tailEnd type="arrow"/>
+            </a:ln>
+          </p:spPr>
+          <p:style>
+            <a:lnRef idx="2">
+              <a:schemeClr val="accent1"/>
+            </a:lnRef>
+            <a:fillRef idx="0">
+              <a:schemeClr val="accent1"/>
+            </a:fillRef>
+            <a:effectRef idx="1">
+              <a:schemeClr val="accent1"/>
+            </a:effectRef>
+            <a:fontRef idx="minor">
+              <a:schemeClr val="tx1"/>
+            </a:fontRef>
+          </p:style>
+        </p:cxnSp>
+        <p:sp>
+          <p:nvSpPr>
+            <p:cNvPr id="7" name="TextBox 6"/>
+            <p:cNvSpPr txBox="1"/>
+            <p:nvPr/>
+          </p:nvSpPr>
+          <p:spPr>
+            <a:xfrm>
+              <a:off x="3584856" y="3810429"/>
+              <a:ext cx="477715" cy="369332"/>
+            </a:xfrm>
+            <a:prstGeom prst="rect">
+              <a:avLst/>
+            </a:prstGeom>
+            <a:noFill/>
+          </p:spPr>
+          <p:txBody>
+            <a:bodyPr wrap="none" rtlCol="0">
+              <a:spAutoFit/>
+            </a:bodyPr>
+            <a:lstStyle/>
+            <a:p>
+              <a:r>
+                <a:rPr lang="en-US" dirty="0" smtClean="0"/>
+                <a:t>mg</a:t>
+              </a:r>
+              <a:endParaRPr lang="en-US" dirty="0"/>
+            </a:p>
+          </p:txBody>
+        </p:sp>
+        <p:cxnSp>
+          <p:nvCxnSpPr>
+            <p:cNvPr id="19" name="Straight Connector 18"/>
+            <p:cNvCxnSpPr>
+              <a:stCxn id="21" idx="4"/>
+              <a:endCxn id="2" idx="5"/>
+            </p:cNvCxnSpPr>
+            <p:nvPr/>
+          </p:nvCxnSpPr>
+          <p:spPr>
+            <a:xfrm flipH="1" flipV="1">
+              <a:off x="4035653" y="3532520"/>
+              <a:ext cx="413667" cy="1798937"/>
+            </a:xfrm>
+            <a:prstGeom prst="line">
+              <a:avLst/>
+            </a:prstGeom>
+            <a:ln>
+              <a:solidFill>
+                <a:schemeClr val="tx1"/>
+              </a:solidFill>
+              <a:prstDash val="dash"/>
+              <a:tailEnd type="triangle"/>
+            </a:ln>
+          </p:spPr>
+          <p:style>
+            <a:lnRef idx="2">
+              <a:schemeClr val="accent1"/>
+            </a:lnRef>
+            <a:fillRef idx="0">
+              <a:schemeClr val="accent1"/>
+            </a:fillRef>
+            <a:effectRef idx="1">
+              <a:schemeClr val="accent1"/>
+            </a:effectRef>
+            <a:fontRef idx="minor">
+              <a:schemeClr val="tx1"/>
+            </a:fontRef>
+          </p:style>
+        </p:cxnSp>
+        <p:sp>
+          <p:nvSpPr>
+            <p:cNvPr id="21" name="Oval 20"/>
+            <p:cNvSpPr/>
+            <p:nvPr/>
+          </p:nvSpPr>
+          <p:spPr>
+            <a:xfrm>
+              <a:off x="4380740" y="5194297"/>
+              <a:ext cx="137160" cy="137160"/>
+            </a:xfrm>
+            <a:prstGeom prst="ellipse">
+              <a:avLst/>
+            </a:prstGeom>
+            <a:solidFill>
+              <a:schemeClr val="tx1"/>
+            </a:solidFill>
+            <a:ln>
+              <a:solidFill>
+                <a:schemeClr val="tx1"/>
+              </a:solidFill>
+            </a:ln>
+          </p:spPr>
+          <p:style>
+            <a:lnRef idx="1">
+              <a:schemeClr val="accent1"/>
+            </a:lnRef>
+            <a:fillRef idx="3">
+              <a:schemeClr val="accent1"/>
+            </a:fillRef>
+            <a:effectRef idx="2">
+              <a:schemeClr val="accent1"/>
+            </a:effectRef>
+            <a:fontRef idx="minor">
+              <a:schemeClr val="lt1"/>
+            </a:fontRef>
+          </p:style>
+          <p:txBody>
+            <a:bodyPr rtlCol="0" anchor="ctr"/>
+            <a:lstStyle/>
+            <a:p>
+              <a:pPr algn="ctr"/>
+              <a:endParaRPr lang="en-US"/>
+            </a:p>
+          </p:txBody>
+        </p:sp>
+        <p:sp>
+          <p:nvSpPr>
+            <p:cNvPr id="23" name="TextBox 22"/>
+            <p:cNvSpPr txBox="1"/>
+            <p:nvPr/>
+          </p:nvSpPr>
+          <p:spPr>
+            <a:xfrm>
+              <a:off x="4105580" y="3227563"/>
+              <a:ext cx="824640" cy="369332"/>
+            </a:xfrm>
+            <a:prstGeom prst="rect">
+              <a:avLst/>
+            </a:prstGeom>
+            <a:noFill/>
+          </p:spPr>
+          <p:txBody>
+            <a:bodyPr wrap="none" rtlCol="0">
+              <a:spAutoFit/>
+            </a:bodyPr>
+            <a:lstStyle/>
+            <a:p>
+              <a:r>
+                <a:rPr lang="en-US" dirty="0" err="1" smtClean="0"/>
+                <a:t>p_com</a:t>
+              </a:r>
+              <a:endParaRPr lang="en-US" dirty="0" smtClean="0"/>
+            </a:p>
+          </p:txBody>
+        </p:sp>
+        <p:cxnSp>
+          <p:nvCxnSpPr>
+            <p:cNvPr id="24" name="Straight Connector 23"/>
+            <p:cNvCxnSpPr/>
+            <p:nvPr/>
+          </p:nvCxnSpPr>
+          <p:spPr>
+            <a:xfrm flipV="1">
+              <a:off x="4477817" y="4084057"/>
+              <a:ext cx="786014" cy="1151961"/>
+            </a:xfrm>
+            <a:prstGeom prst="line">
+              <a:avLst/>
+            </a:prstGeom>
+            <a:ln>
+              <a:solidFill>
+                <a:schemeClr val="tx1"/>
+              </a:solidFill>
+              <a:prstDash val="dash"/>
+              <a:tailEnd type="triangle"/>
+            </a:ln>
+          </p:spPr>
+          <p:style>
+            <a:lnRef idx="2">
+              <a:schemeClr val="accent1"/>
+            </a:lnRef>
+            <a:fillRef idx="0">
+              <a:schemeClr val="accent1"/>
+            </a:fillRef>
+            <a:effectRef idx="1">
+              <a:schemeClr val="accent1"/>
+            </a:effectRef>
+            <a:fontRef idx="minor">
+              <a:schemeClr val="tx1"/>
+            </a:fontRef>
+          </p:style>
+        </p:cxnSp>
+        <p:sp>
+          <p:nvSpPr>
+            <p:cNvPr id="26" name="TextBox 25"/>
+            <p:cNvSpPr txBox="1"/>
+            <p:nvPr/>
+          </p:nvSpPr>
+          <p:spPr>
+            <a:xfrm>
+              <a:off x="5288862" y="3744147"/>
+              <a:ext cx="439506" cy="369332"/>
+            </a:xfrm>
+            <a:prstGeom prst="rect">
+              <a:avLst/>
+            </a:prstGeom>
+            <a:noFill/>
+          </p:spPr>
+          <p:txBody>
+            <a:bodyPr wrap="none" rtlCol="0">
+              <a:spAutoFit/>
+            </a:bodyPr>
+            <a:lstStyle/>
+            <a:p>
+              <a:r>
+                <a:rPr lang="en-US" dirty="0" err="1" smtClean="0"/>
+                <a:t>dA</a:t>
+              </a:r>
+              <a:endParaRPr lang="en-US" dirty="0"/>
+            </a:p>
+          </p:txBody>
+        </p:sp>
+        <p:sp>
+          <p:nvSpPr>
+            <p:cNvPr id="27" name="TextBox 26"/>
+            <p:cNvSpPr txBox="1"/>
+            <p:nvPr/>
+          </p:nvSpPr>
+          <p:spPr>
+            <a:xfrm>
+              <a:off x="5008640" y="4132209"/>
+              <a:ext cx="317327" cy="369332"/>
+            </a:xfrm>
+            <a:prstGeom prst="rect">
+              <a:avLst/>
+            </a:prstGeom>
+            <a:noFill/>
+          </p:spPr>
+          <p:txBody>
+            <a:bodyPr wrap="none" rtlCol="0">
+              <a:spAutoFit/>
+            </a:bodyPr>
+            <a:lstStyle/>
+            <a:p>
+              <a:r>
+                <a:rPr lang="en-US" dirty="0" smtClean="0"/>
+                <a:t> r</a:t>
+              </a:r>
+            </a:p>
+          </p:txBody>
+        </p:sp>
+        <p:grpSp>
+          <p:nvGrpSpPr>
+            <p:cNvPr id="33" name="Group 32"/>
+            <p:cNvGrpSpPr/>
+            <p:nvPr/>
+          </p:nvGrpSpPr>
+          <p:grpSpPr>
+            <a:xfrm>
+              <a:off x="3677070" y="5518068"/>
+              <a:ext cx="911342" cy="882889"/>
+              <a:chOff x="3066715" y="5374891"/>
+              <a:chExt cx="911342" cy="882889"/>
+            </a:xfrm>
+          </p:grpSpPr>
+          <p:cxnSp>
+            <p:nvCxnSpPr>
+              <p:cNvPr id="29" name="Straight Arrow Connector 28"/>
+              <p:cNvCxnSpPr/>
+              <p:nvPr/>
+            </p:nvCxnSpPr>
+            <p:spPr>
+              <a:xfrm flipV="1">
+                <a:off x="3376484" y="5374891"/>
+                <a:ext cx="15489" cy="604073"/>
+              </a:xfrm>
+              <a:prstGeom prst="straightConnector1">
+                <a:avLst/>
+              </a:prstGeom>
+              <a:ln>
+                <a:solidFill>
+                  <a:schemeClr val="tx1"/>
+                </a:solidFill>
+                <a:tailEnd type="arrow"/>
+              </a:ln>
+            </p:spPr>
+            <p:style>
+              <a:lnRef idx="2">
+                <a:schemeClr val="accent1"/>
+              </a:lnRef>
+              <a:fillRef idx="0">
+                <a:schemeClr val="accent1"/>
+              </a:fillRef>
+              <a:effectRef idx="1">
+                <a:schemeClr val="accent1"/>
+              </a:effectRef>
+              <a:fontRef idx="minor">
+                <a:schemeClr val="tx1"/>
+              </a:fontRef>
+            </p:style>
+          </p:cxnSp>
+          <p:cxnSp>
+            <p:nvCxnSpPr>
+              <p:cNvPr id="30" name="Straight Arrow Connector 29"/>
+              <p:cNvCxnSpPr/>
+              <p:nvPr/>
+            </p:nvCxnSpPr>
+            <p:spPr>
+              <a:xfrm rot="5400000" flipV="1">
+                <a:off x="3668276" y="5666701"/>
+                <a:ext cx="15489" cy="604073"/>
+              </a:xfrm>
+              <a:prstGeom prst="straightConnector1">
+                <a:avLst/>
+              </a:prstGeom>
+              <a:ln>
+                <a:solidFill>
+                  <a:schemeClr val="tx1"/>
+                </a:solidFill>
+                <a:tailEnd type="arrow"/>
+              </a:ln>
+            </p:spPr>
+            <p:style>
+              <a:lnRef idx="2">
+                <a:schemeClr val="accent1"/>
+              </a:lnRef>
+              <a:fillRef idx="0">
+                <a:schemeClr val="accent1"/>
+              </a:fillRef>
+              <a:effectRef idx="1">
+                <a:schemeClr val="accent1"/>
+              </a:effectRef>
+              <a:fontRef idx="minor">
+                <a:schemeClr val="tx1"/>
+              </a:fontRef>
+            </p:style>
+          </p:cxnSp>
+          <p:cxnSp>
+            <p:nvCxnSpPr>
+              <p:cNvPr id="31" name="Straight Arrow Connector 30"/>
+              <p:cNvCxnSpPr/>
+              <p:nvPr/>
+            </p:nvCxnSpPr>
+            <p:spPr>
+              <a:xfrm flipH="1">
+                <a:off x="3066715" y="5959513"/>
+                <a:ext cx="307270" cy="298267"/>
+              </a:xfrm>
+              <a:prstGeom prst="straightConnector1">
+                <a:avLst/>
+              </a:prstGeom>
+              <a:ln>
+                <a:solidFill>
+                  <a:schemeClr val="tx1"/>
+                </a:solidFill>
+                <a:tailEnd type="arrow"/>
+              </a:ln>
+            </p:spPr>
+            <p:style>
+              <a:lnRef idx="2">
+                <a:schemeClr val="accent1"/>
+              </a:lnRef>
+              <a:fillRef idx="0">
+                <a:schemeClr val="accent1"/>
+              </a:fillRef>
+              <a:effectRef idx="1">
+                <a:schemeClr val="accent1"/>
+              </a:effectRef>
+              <a:fontRef idx="minor">
+                <a:schemeClr val="tx1"/>
+              </a:fontRef>
+            </p:style>
+          </p:cxnSp>
+        </p:grpSp>
+        <p:sp>
+          <p:nvSpPr>
+            <p:cNvPr id="34" name="TextBox 33"/>
+            <p:cNvSpPr txBox="1"/>
+            <p:nvPr/>
+          </p:nvSpPr>
+          <p:spPr>
+            <a:xfrm>
+              <a:off x="3491928" y="6277037"/>
+              <a:ext cx="289600" cy="369332"/>
+            </a:xfrm>
+            <a:prstGeom prst="rect">
+              <a:avLst/>
+            </a:prstGeom>
+            <a:noFill/>
+          </p:spPr>
+          <p:txBody>
+            <a:bodyPr wrap="none" rtlCol="0">
+              <a:spAutoFit/>
+            </a:bodyPr>
+            <a:lstStyle/>
+            <a:p>
+              <a:r>
+                <a:rPr lang="en-US" dirty="0" smtClean="0"/>
+                <a:t>k</a:t>
+              </a:r>
+              <a:endParaRPr lang="en-US" dirty="0"/>
+            </a:p>
+          </p:txBody>
+        </p:sp>
+        <p:sp>
+          <p:nvSpPr>
+            <p:cNvPr id="35" name="TextBox 34"/>
+            <p:cNvSpPr txBox="1"/>
+            <p:nvPr/>
+          </p:nvSpPr>
+          <p:spPr>
+            <a:xfrm>
+              <a:off x="4304520" y="6060105"/>
+              <a:ext cx="237640" cy="369332"/>
+            </a:xfrm>
+            <a:prstGeom prst="rect">
+              <a:avLst/>
+            </a:prstGeom>
+            <a:noFill/>
+          </p:spPr>
+          <p:txBody>
+            <a:bodyPr wrap="none" rtlCol="0">
+              <a:spAutoFit/>
+            </a:bodyPr>
+            <a:lstStyle/>
+            <a:p>
+              <a:r>
+                <a:rPr lang="en-US" dirty="0" err="1"/>
+                <a:t>i</a:t>
+              </a:r>
+              <a:endParaRPr lang="en-US" dirty="0" smtClean="0"/>
+            </a:p>
+          </p:txBody>
+        </p:sp>
+        <p:sp>
+          <p:nvSpPr>
+            <p:cNvPr id="36" name="TextBox 35"/>
+            <p:cNvSpPr txBox="1"/>
+            <p:nvPr/>
+          </p:nvSpPr>
+          <p:spPr>
+            <a:xfrm>
+              <a:off x="3710227" y="5424966"/>
+              <a:ext cx="239894" cy="369332"/>
+            </a:xfrm>
+            <a:prstGeom prst="rect">
+              <a:avLst/>
+            </a:prstGeom>
+            <a:noFill/>
+          </p:spPr>
+          <p:txBody>
+            <a:bodyPr wrap="none" rtlCol="0">
+              <a:spAutoFit/>
+            </a:bodyPr>
+            <a:lstStyle/>
+            <a:p>
+              <a:r>
+                <a:rPr lang="en-US" dirty="0"/>
+                <a:t>j</a:t>
+              </a:r>
+            </a:p>
+          </p:txBody>
+        </p:sp>
+        <p:sp>
+          <p:nvSpPr>
+            <p:cNvPr id="38" name="TextBox 37"/>
+            <p:cNvSpPr txBox="1"/>
+            <p:nvPr/>
+          </p:nvSpPr>
+          <p:spPr>
+            <a:xfrm>
+              <a:off x="5551651" y="2602246"/>
+              <a:ext cx="312906" cy="369332"/>
+            </a:xfrm>
+            <a:prstGeom prst="rect">
+              <a:avLst/>
+            </a:prstGeom>
+            <a:noFill/>
+          </p:spPr>
+          <p:txBody>
+            <a:bodyPr wrap="none" rtlCol="0">
+              <a:spAutoFit/>
+            </a:bodyPr>
+            <a:lstStyle/>
+            <a:p>
+              <a:r>
+                <a:rPr lang="en-US" dirty="0" smtClean="0"/>
+                <a:t>R</a:t>
+              </a:r>
+              <a:endParaRPr lang="en-US" dirty="0"/>
+            </a:p>
+          </p:txBody>
+        </p:sp>
+        <p:cxnSp>
+          <p:nvCxnSpPr>
+            <p:cNvPr id="39" name="Straight Arrow Connector 38"/>
+            <p:cNvCxnSpPr/>
+            <p:nvPr/>
+          </p:nvCxnSpPr>
+          <p:spPr>
+            <a:xfrm flipH="1">
+              <a:off x="5263831" y="2971578"/>
+              <a:ext cx="287820" cy="632576"/>
+            </a:xfrm>
+            <a:prstGeom prst="straightConnector1">
+              <a:avLst/>
+            </a:prstGeom>
+            <a:ln>
+              <a:solidFill>
+                <a:schemeClr val="tx1"/>
+              </a:solidFill>
+              <a:tailEnd type="arrow"/>
+            </a:ln>
+          </p:spPr>
+          <p:style>
+            <a:lnRef idx="2">
+              <a:schemeClr val="accent1"/>
+            </a:lnRef>
+            <a:fillRef idx="0">
+              <a:schemeClr val="accent1"/>
+            </a:fillRef>
+            <a:effectRef idx="1">
+              <a:schemeClr val="accent1"/>
+            </a:effectRef>
+            <a:fontRef idx="minor">
+              <a:schemeClr val="tx1"/>
+            </a:fontRef>
+          </p:style>
+        </p:cxnSp>
+        <p:cxnSp>
+          <p:nvCxnSpPr>
+            <p:cNvPr id="41" name="Straight Arrow Connector 40"/>
+            <p:cNvCxnSpPr/>
+            <p:nvPr/>
+          </p:nvCxnSpPr>
+          <p:spPr>
+            <a:xfrm>
+              <a:off x="5263831" y="4084057"/>
+              <a:ext cx="600726" cy="417484"/>
+            </a:xfrm>
+            <a:prstGeom prst="straightConnector1">
+              <a:avLst/>
+            </a:prstGeom>
+            <a:ln>
+              <a:solidFill>
+                <a:schemeClr val="tx1"/>
+              </a:solidFill>
+              <a:tailEnd type="arrow"/>
+            </a:ln>
+          </p:spPr>
+          <p:style>
+            <a:lnRef idx="2">
+              <a:schemeClr val="accent1"/>
+            </a:lnRef>
+            <a:fillRef idx="0">
+              <a:schemeClr val="accent1"/>
+            </a:fillRef>
+            <a:effectRef idx="1">
+              <a:schemeClr val="accent1"/>
+            </a:effectRef>
+            <a:fontRef idx="minor">
+              <a:schemeClr val="tx1"/>
+            </a:fontRef>
+          </p:style>
+        </p:cxnSp>
+        <p:sp>
+          <p:nvSpPr>
+            <p:cNvPr id="43" name="TextBox 42"/>
+            <p:cNvSpPr txBox="1"/>
+            <p:nvPr/>
+          </p:nvSpPr>
+          <p:spPr>
+            <a:xfrm>
+              <a:off x="5864557" y="4260836"/>
+              <a:ext cx="646331" cy="369332"/>
+            </a:xfrm>
+            <a:prstGeom prst="rect">
+              <a:avLst/>
+            </a:prstGeom>
+            <a:noFill/>
+          </p:spPr>
+          <p:txBody>
+            <a:bodyPr wrap="none" rtlCol="0">
+              <a:spAutoFit/>
+            </a:bodyPr>
+            <a:lstStyle/>
+            <a:p>
+              <a:r>
+                <a:rPr lang="en-US" dirty="0" smtClean="0"/>
+                <a:t>-k x r</a:t>
+              </a:r>
+              <a:endParaRPr lang="en-US" dirty="0"/>
+            </a:p>
+          </p:txBody>
+        </p:sp>
+      </p:grpSp>
+    </p:spTree>
+    <p:extLst>
+      <p:ext uri="{BB962C8B-B14F-4D97-AF65-F5344CB8AC3E}">
+        <p14:creationId xmlns:p14="http://schemas.microsoft.com/office/powerpoint/2010/main" val="740654506"/>
       </p:ext>
     </p:extLst>
   </p:cSld>

</xml_diff>